<commit_message>
Work on NULL values talk
</commit_message>
<xml_diff>
--- a/src/null-values.pptx
+++ b/src/null-values.pptx
@@ -11782,23 +11782,7 @@
             </a:r>
             <a:r>
               <a:rPr/>
-              <a:t>examples</a:t>
-            </a:r>
-            <a:r>
-              <a:rPr/>
-              <a:t> </a:t>
-            </a:r>
-            <a:r>
-              <a:rPr/>
-              <a:t>within</a:t>
-            </a:r>
-            <a:r>
-              <a:rPr/>
-              <a:t> </a:t>
-            </a:r>
-            <a:r>
-              <a:rPr/>
-              <a:t>R:</a:t>
+              <a:t>examples:</a:t>
             </a:r>
             <a:r>
               <a:rPr/>

</xml_diff>

<commit_message>
Expanded three valued logic discussion in null-values.Rmd.
</commit_message>
<xml_diff>
--- a/src/null-values.pptx
+++ b/src/null-values.pptx
@@ -5,7 +5,7 @@
     <p:sldMasterId id="2147483648" r:id="rId1"/>
   </p:sldMasterIdLst>
   <p:notesMasterIdLst>
-    <p:NotesMasterId r:id="rId27"/>
+    <p:NotesMasterId r:id="rId28"/>
   </p:notesMasterIdLst>
   <p:sldIdLst>
     <p:sldId id="256" r:id="rId2"/>
@@ -33,6 +33,7 @@
     <p:sldId id="278" r:id="rId24"/>
     <p:sldId id="279" r:id="rId25"/>
     <p:sldId id="280" r:id="rId26"/>
+    <p:sldId id="281" r:id="rId27"/>
   </p:sldIdLst>
   <p:sldSz cx="9144000" cy="6858000" type="screen4x3"/>
   <p:notesSz cx="6858000" cy="9144000"/>
@@ -8401,215 +8402,23 @@
             </a:pPr>
             <a:r>
               <a:rPr/>
-              <a:t>There</a:t>
-            </a:r>
-            <a:r>
-              <a:rPr/>
-              <a:t> </a:t>
-            </a:r>
-            <a:r>
-              <a:rPr/>
-              <a:t>is</a:t>
-            </a:r>
-            <a:r>
-              <a:rPr/>
-              <a:t> </a:t>
-            </a:r>
-            <a:r>
-              <a:rPr/>
-              <a:t>a</a:t>
-            </a:r>
-            <a:r>
-              <a:rPr/>
-              <a:t> </a:t>
-            </a:r>
-            <a:r>
-              <a:rPr/>
-              <a:t>strong</a:t>
-            </a:r>
-            <a:r>
-              <a:rPr/>
-              <a:t> </a:t>
-            </a:r>
-            <a:r>
-              <a:rPr/>
-              <a:t>debate</a:t>
-            </a:r>
-            <a:r>
-              <a:rPr/>
-              <a:t> </a:t>
-            </a:r>
-            <a:r>
-              <a:rPr/>
-              <a:t>about</a:t>
-            </a:r>
-            <a:r>
-              <a:rPr/>
-              <a:t> </a:t>
-            </a:r>
-            <a:r>
-              <a:rPr/>
-              <a:t>whether</a:t>
-            </a:r>
-            <a:r>
-              <a:rPr/>
-              <a:t> </a:t>
-            </a:r>
-            <a:r>
-              <a:rPr/>
-              <a:t>you</a:t>
-            </a:r>
-            <a:r>
-              <a:rPr/>
-              <a:t> </a:t>
-            </a:r>
-            <a:r>
-              <a:rPr/>
-              <a:t>should</a:t>
-            </a:r>
-            <a:r>
-              <a:rPr/>
-              <a:t> </a:t>
-            </a:r>
-            <a:r>
-              <a:rPr/>
-              <a:t>use</a:t>
-            </a:r>
-            <a:r>
-              <a:rPr/>
-              <a:t> </a:t>
-            </a:r>
-            <a:r>
-              <a:rPr/>
-              <a:t>null</a:t>
-            </a:r>
-            <a:r>
-              <a:rPr/>
-              <a:t> </a:t>
-            </a:r>
-            <a:r>
-              <a:rPr/>
-              <a:t>values</a:t>
-            </a:r>
-            <a:r>
-              <a:rPr/>
-              <a:t> </a:t>
-            </a:r>
-            <a:r>
-              <a:rPr/>
-              <a:t>at</a:t>
-            </a:r>
-            <a:r>
-              <a:rPr/>
-              <a:t> </a:t>
-            </a:r>
-            <a:r>
-              <a:rPr/>
-              <a:t>all</a:t>
-            </a:r>
-            <a:r>
-              <a:rPr/>
-              <a:t> </a:t>
-            </a:r>
-            <a:r>
-              <a:rPr/>
-              <a:t>in</a:t>
-            </a:r>
-            <a:r>
-              <a:rPr/>
-              <a:t> </a:t>
-            </a:r>
-            <a:r>
-              <a:rPr/>
-              <a:t>databases.</a:t>
-            </a:r>
-            <a:r>
-              <a:rPr/>
-              <a:t> </a:t>
-            </a:r>
-            <a:r>
-              <a:rPr/>
-              <a:t>The</a:t>
-            </a:r>
-            <a:r>
-              <a:rPr/>
-              <a:t> </a:t>
-            </a:r>
-            <a:r>
-              <a:rPr/>
-              <a:t>potential</a:t>
-            </a:r>
-            <a:r>
-              <a:rPr/>
-              <a:t> </a:t>
-            </a:r>
-            <a:r>
-              <a:rPr/>
-              <a:t>for</a:t>
-            </a:r>
-            <a:r>
-              <a:rPr/>
-              <a:t> </a:t>
-            </a:r>
-            <a:r>
-              <a:rPr/>
-              <a:t>confusion</a:t>
-            </a:r>
-            <a:r>
-              <a:rPr/>
-              <a:t> </a:t>
-            </a:r>
-            <a:r>
-              <a:rPr/>
-              <a:t>is</a:t>
-            </a:r>
-            <a:r>
-              <a:rPr/>
-              <a:t> </a:t>
-            </a:r>
-            <a:r>
-              <a:rPr/>
-              <a:t>great.</a:t>
-            </a:r>
-            <a:r>
-              <a:rPr/>
-              <a:t> </a:t>
-            </a:r>
-            <a:r>
-              <a:rPr/>
-              <a:t>There</a:t>
-            </a:r>
-            <a:r>
-              <a:rPr/>
-              <a:t> </a:t>
-            </a:r>
-            <a:r>
-              <a:rPr/>
-              <a:t>is</a:t>
-            </a:r>
-            <a:r>
-              <a:rPr/>
-              <a:t> </a:t>
-            </a:r>
-            <a:r>
-              <a:rPr/>
-              <a:t>a</a:t>
-            </a:r>
-            <a:r>
-              <a:rPr/>
-              <a:t> </a:t>
-            </a:r>
-            <a:r>
-              <a:rPr/>
-              <a:t>general</a:t>
-            </a:r>
-            <a:r>
-              <a:rPr/>
-              <a:t> </a:t>
-            </a:r>
-            <a:r>
-              <a:rPr/>
-              <a:t>consensus</a:t>
+              <a:t>You</a:t>
+            </a:r>
+            <a:r>
+              <a:rPr/>
+              <a:t> </a:t>
+            </a:r>
+            <a:r>
+              <a:rPr/>
+              <a:t>might</a:t>
+            </a:r>
+            <a:r>
+              <a:rPr/>
+              <a:t> </a:t>
+            </a:r>
+            <a:r>
+              <a:rPr/>
+              <a:t>think</a:t>
             </a:r>
             <a:r>
               <a:rPr/>
@@ -8625,15 +8434,135 @@
             </a:r>
             <a:r>
               <a:rPr/>
-              <a:t>you</a:t>
-            </a:r>
-            <a:r>
-              <a:rPr/>
-              <a:t> </a:t>
-            </a:r>
-            <a:r>
-              <a:rPr/>
-              <a:t>should</a:t>
+              <a:t>any</a:t>
+            </a:r>
+            <a:r>
+              <a:rPr/>
+              <a:t> </a:t>
+            </a:r>
+            <a:r>
+              <a:rPr/>
+              <a:t>Boolean</a:t>
+            </a:r>
+            <a:r>
+              <a:rPr/>
+              <a:t> </a:t>
+            </a:r>
+            <a:r>
+              <a:rPr/>
+              <a:t>logic</a:t>
+            </a:r>
+            <a:r>
+              <a:rPr/>
+              <a:t> </a:t>
+            </a:r>
+            <a:r>
+              <a:rPr/>
+              <a:t>statement</a:t>
+            </a:r>
+            <a:r>
+              <a:rPr/>
+              <a:t> </a:t>
+            </a:r>
+            <a:r>
+              <a:rPr/>
+              <a:t>with</a:t>
+            </a:r>
+            <a:r>
+              <a:rPr/>
+              <a:t> </a:t>
+            </a:r>
+            <a:r>
+              <a:rPr/>
+              <a:t>one</a:t>
+            </a:r>
+            <a:r>
+              <a:rPr/>
+              <a:t> </a:t>
+            </a:r>
+            <a:r>
+              <a:rPr/>
+              <a:t>of</a:t>
+            </a:r>
+            <a:r>
+              <a:rPr/>
+              <a:t> </a:t>
+            </a:r>
+            <a:r>
+              <a:rPr/>
+              <a:t>the</a:t>
+            </a:r>
+            <a:r>
+              <a:rPr/>
+              <a:t> </a:t>
+            </a:r>
+            <a:r>
+              <a:rPr/>
+              <a:t>two</a:t>
+            </a:r>
+            <a:r>
+              <a:rPr/>
+              <a:t> </a:t>
+            </a:r>
+            <a:r>
+              <a:rPr/>
+              <a:t>conditions</a:t>
+            </a:r>
+            <a:r>
+              <a:rPr/>
+              <a:t> </a:t>
+            </a:r>
+            <a:r>
+              <a:rPr/>
+              <a:t>being</a:t>
+            </a:r>
+            <a:r>
+              <a:rPr/>
+              <a:t> </a:t>
+            </a:r>
+            <a:r>
+              <a:rPr/>
+              <a:t>UNKNOWN</a:t>
+            </a:r>
+            <a:r>
+              <a:rPr/>
+              <a:t> </a:t>
+            </a:r>
+            <a:r>
+              <a:rPr/>
+              <a:t>would</a:t>
+            </a:r>
+            <a:r>
+              <a:rPr/>
+              <a:t> </a:t>
+            </a:r>
+            <a:r>
+              <a:rPr/>
+              <a:t>end</a:t>
+            </a:r>
+            <a:r>
+              <a:rPr/>
+              <a:t> </a:t>
+            </a:r>
+            <a:r>
+              <a:rPr/>
+              <a:t>up</a:t>
+            </a:r>
+            <a:r>
+              <a:rPr/>
+              <a:t> </a:t>
+            </a:r>
+            <a:r>
+              <a:rPr/>
+              <a:t>helpless.</a:t>
+            </a:r>
+            <a:r>
+              <a:rPr/>
+              <a:t> </a:t>
+            </a:r>
+            <a:r>
+              <a:rPr/>
+              <a:t>But</a:t>
             </a:r>
             <a:r>
               <a:rPr/>
@@ -8649,303 +8578,7 @@
             </a:r>
             <a:r>
               <a:rPr/>
-              <a:t>use</a:t>
-            </a:r>
-            <a:r>
-              <a:rPr/>
-              <a:t> </a:t>
-            </a:r>
-            <a:r>
-              <a:rPr/>
-              <a:t>null</a:t>
-            </a:r>
-            <a:r>
-              <a:rPr/>
-              <a:t> </a:t>
-            </a:r>
-            <a:r>
-              <a:rPr/>
-              <a:t>values</a:t>
-            </a:r>
-            <a:r>
-              <a:rPr/>
-              <a:t> </a:t>
-            </a:r>
-            <a:r>
-              <a:rPr/>
-              <a:t>for</a:t>
-            </a:r>
-            <a:r>
-              <a:rPr/>
-              <a:t> </a:t>
-            </a:r>
-            <a:r>
-              <a:rPr/>
-              <a:t>identification</a:t>
-            </a:r>
-            <a:r>
-              <a:rPr/>
-              <a:t> </a:t>
-            </a:r>
-            <a:r>
-              <a:rPr/>
-              <a:t>codes.</a:t>
-            </a:r>
-            <a:r>
-              <a:rPr/>
-              <a:t> </a:t>
-            </a:r>
-            <a:r>
-              <a:rPr/>
-              <a:t>For</a:t>
-            </a:r>
-            <a:r>
-              <a:rPr/>
-              <a:t> </a:t>
-            </a:r>
-            <a:r>
-              <a:rPr/>
-              <a:t>other</a:t>
-            </a:r>
-            <a:r>
-              <a:rPr/>
-              <a:t> </a:t>
-            </a:r>
-            <a:r>
-              <a:rPr/>
-              <a:t>settings,</a:t>
-            </a:r>
-            <a:r>
-              <a:rPr/>
-              <a:t> </a:t>
-            </a:r>
-            <a:r>
-              <a:rPr/>
-              <a:t>you</a:t>
-            </a:r>
-            <a:r>
-              <a:rPr/>
-              <a:t> </a:t>
-            </a:r>
-            <a:r>
-              <a:rPr/>
-              <a:t>can</a:t>
-            </a:r>
-            <a:r>
-              <a:rPr/>
-              <a:t> </a:t>
-            </a:r>
-            <a:r>
-              <a:rPr/>
-              <a:t>use</a:t>
-            </a:r>
-            <a:r>
-              <a:rPr/>
-              <a:t> </a:t>
-            </a:r>
-            <a:r>
-              <a:rPr/>
-              <a:t>extreme</a:t>
-            </a:r>
-            <a:r>
-              <a:rPr/>
-              <a:t> </a:t>
-            </a:r>
-            <a:r>
-              <a:rPr/>
-              <a:t>codes</a:t>
-            </a:r>
-            <a:r>
-              <a:rPr/>
-              <a:t> </a:t>
-            </a:r>
-            <a:r>
-              <a:rPr/>
-              <a:t>like</a:t>
-            </a:r>
-            <a:r>
-              <a:rPr/>
-              <a:t> </a:t>
-            </a:r>
-            <a:r>
-              <a:rPr/>
-              <a:t>-1</a:t>
-            </a:r>
-            <a:r>
-              <a:rPr/>
-              <a:t> </a:t>
-            </a:r>
-            <a:r>
-              <a:rPr/>
-              <a:t>and</a:t>
-            </a:r>
-            <a:r>
-              <a:rPr/>
-              <a:t> </a:t>
-            </a:r>
-            <a:r>
-              <a:rPr/>
-              <a:t>99.</a:t>
-            </a:r>
-            <a:r>
-              <a:rPr/>
-              <a:t> </a:t>
-            </a:r>
-            <a:r>
-              <a:rPr/>
-              <a:t>Then</a:t>
-            </a:r>
-            <a:r>
-              <a:rPr/>
-              <a:t> </a:t>
-            </a:r>
-            <a:r>
-              <a:rPr/>
-              <a:t>you</a:t>
-            </a:r>
-            <a:r>
-              <a:rPr/>
-              <a:t> </a:t>
-            </a:r>
-            <a:r>
-              <a:rPr/>
-              <a:t>can</a:t>
-            </a:r>
-            <a:r>
-              <a:rPr/>
-              <a:t> </a:t>
-            </a:r>
-            <a:r>
-              <a:rPr/>
-              <a:t>track</a:t>
-            </a:r>
-            <a:r>
-              <a:rPr/>
-              <a:t> </a:t>
-            </a:r>
-            <a:r>
-              <a:rPr/>
-              <a:t>those</a:t>
-            </a:r>
-            <a:r>
-              <a:rPr/>
-              <a:t> </a:t>
-            </a:r>
-            <a:r>
-              <a:rPr/>
-              <a:t>codes</a:t>
-            </a:r>
-            <a:r>
-              <a:rPr/>
-              <a:t> </a:t>
-            </a:r>
-            <a:r>
-              <a:rPr/>
-              <a:t>explicitly</a:t>
-            </a:r>
-            <a:r>
-              <a:rPr/>
-              <a:t> </a:t>
-            </a:r>
-            <a:r>
-              <a:rPr/>
-              <a:t>because</a:t>
-            </a:r>
-            <a:r>
-              <a:rPr/>
-              <a:t> </a:t>
-            </a:r>
-            <a:r>
-              <a:rPr/>
-              <a:t>=-1</a:t>
-            </a:r>
-            <a:r>
-              <a:rPr/>
-              <a:t> </a:t>
-            </a:r>
-            <a:r>
-              <a:rPr/>
-              <a:t>or</a:t>
-            </a:r>
-            <a:r>
-              <a:rPr/>
-              <a:t> </a:t>
-            </a:r>
-            <a:r>
-              <a:rPr/>
-              <a:t>=99</a:t>
-            </a:r>
-            <a:r>
-              <a:rPr/>
-              <a:t> </a:t>
-            </a:r>
-            <a:r>
-              <a:rPr/>
-              <a:t>does</a:t>
-            </a:r>
-            <a:r>
-              <a:rPr/>
-              <a:t> </a:t>
-            </a:r>
-            <a:r>
-              <a:rPr/>
-              <a:t>not</a:t>
-            </a:r>
-            <a:r>
-              <a:rPr/>
-              <a:t> </a:t>
-            </a:r>
-            <a:r>
-              <a:rPr/>
-              <a:t>invoke</a:t>
-            </a:r>
-            <a:r>
-              <a:rPr/>
-              <a:t> </a:t>
-            </a:r>
-            <a:r>
-              <a:rPr/>
-              <a:t>the</a:t>
-            </a:r>
-            <a:r>
-              <a:rPr/>
-              <a:t> </a:t>
-            </a:r>
-            <a:r>
-              <a:rPr/>
-              <a:t>monster</a:t>
-            </a:r>
-            <a:r>
-              <a:rPr/>
-              <a:t> </a:t>
-            </a:r>
-            <a:r>
-              <a:rPr/>
-              <a:t>of</a:t>
-            </a:r>
-            <a:r>
-              <a:rPr/>
-              <a:t> </a:t>
-            </a:r>
-            <a:r>
-              <a:rPr/>
-              <a:t>three</a:t>
-            </a:r>
-            <a:r>
-              <a:rPr/>
-              <a:t> </a:t>
-            </a:r>
-            <a:r>
-              <a:rPr/>
-              <a:t>valued</a:t>
-            </a:r>
-            <a:r>
-              <a:rPr/>
-              <a:t> </a:t>
-            </a:r>
-            <a:r>
-              <a:rPr/>
-              <a:t>logic.</a:t>
+              <a:t>always.</a:t>
             </a:r>
           </a:p>
           <a:p>
@@ -8959,6 +8592,54 @@
             </a:pPr>
             <a:r>
               <a:rPr/>
+              <a:t>Consider</a:t>
+            </a:r>
+            <a:r>
+              <a:rPr/>
+              <a:t> </a:t>
+            </a:r>
+            <a:r>
+              <a:rPr/>
+              <a:t>the</a:t>
+            </a:r>
+            <a:r>
+              <a:rPr/>
+              <a:t> </a:t>
+            </a:r>
+            <a:r>
+              <a:rPr/>
+              <a:t>statement</a:t>
+            </a:r>
+            <a:r>
+              <a:rPr/>
+              <a:t> </a:t>
+            </a:r>
+            <a:r>
+              <a:rPr/>
+              <a:t>FALSE</a:t>
+            </a:r>
+            <a:r>
+              <a:rPr/>
+              <a:t> </a:t>
+            </a:r>
+            <a:r>
+              <a:rPr/>
+              <a:t>and</a:t>
+            </a:r>
+            <a:r>
+              <a:rPr/>
+              <a:t> </a:t>
+            </a:r>
+            <a:r>
+              <a:rPr/>
+              <a:t>UNKNOWN.</a:t>
+            </a:r>
+            <a:r>
+              <a:rPr/>
+              <a:t> </a:t>
+            </a:r>
+            <a:r>
+              <a:rPr/>
               <a:t>It</a:t>
             </a:r>
             <a:r>
@@ -8967,39 +8648,31 @@
             </a:r>
             <a:r>
               <a:rPr/>
-              <a:t>is</a:t>
-            </a:r>
-            <a:r>
-              <a:rPr/>
-              <a:t> </a:t>
-            </a:r>
-            <a:r>
-              <a:rPr/>
-              <a:t>still</a:t>
-            </a:r>
-            <a:r>
-              <a:rPr/>
-              <a:t> </a:t>
-            </a:r>
-            <a:r>
-              <a:rPr/>
-              <a:t>tricky</a:t>
-            </a:r>
-            <a:r>
-              <a:rPr/>
-              <a:t> </a:t>
-            </a:r>
-            <a:r>
-              <a:rPr/>
-              <a:t>though.</a:t>
-            </a:r>
-            <a:r>
-              <a:rPr/>
-              <a:t> </a:t>
-            </a:r>
-            <a:r>
-              <a:rPr/>
-              <a:t>If</a:t>
+              <a:t>doesn’t</a:t>
+            </a:r>
+            <a:r>
+              <a:rPr/>
+              <a:t> </a:t>
+            </a:r>
+            <a:r>
+              <a:rPr/>
+              <a:t>really</a:t>
+            </a:r>
+            <a:r>
+              <a:rPr/>
+              <a:t> </a:t>
+            </a:r>
+            <a:r>
+              <a:rPr/>
+              <a:t>matter</a:t>
+            </a:r>
+            <a:r>
+              <a:rPr/>
+              <a:t> </a:t>
+            </a:r>
+            <a:r>
+              <a:rPr/>
+              <a:t>what</a:t>
             </a:r>
             <a:r>
               <a:rPr/>
@@ -9015,63 +8688,31 @@
             </a:r>
             <a:r>
               <a:rPr/>
-              <a:t>missing</a:t>
-            </a:r>
-            <a:r>
-              <a:rPr/>
-              <a:t> </a:t>
-            </a:r>
-            <a:r>
-              <a:rPr/>
-              <a:t>value</a:t>
-            </a:r>
-            <a:r>
-              <a:rPr/>
-              <a:t> </a:t>
-            </a:r>
-            <a:r>
-              <a:rPr/>
-              <a:t>code</a:t>
-            </a:r>
-            <a:r>
-              <a:rPr/>
-              <a:t> </a:t>
-            </a:r>
-            <a:r>
-              <a:rPr/>
-              <a:t>for</a:t>
-            </a:r>
-            <a:r>
-              <a:rPr/>
-              <a:t> </a:t>
-            </a:r>
-            <a:r>
-              <a:rPr/>
-              <a:t>age</a:t>
-            </a:r>
-            <a:r>
-              <a:rPr/>
-              <a:t> </a:t>
-            </a:r>
-            <a:r>
-              <a:rPr/>
-              <a:t>is</a:t>
-            </a:r>
-            <a:r>
-              <a:rPr/>
-              <a:t> </a:t>
-            </a:r>
-            <a:r>
-              <a:rPr/>
-              <a:t>-1</a:t>
-            </a:r>
-            <a:r>
-              <a:rPr/>
-              <a:t> </a:t>
-            </a:r>
-            <a:r>
-              <a:rPr/>
-              <a:t>then</a:t>
+              <a:t>second</a:t>
+            </a:r>
+            <a:r>
+              <a:rPr/>
+              <a:t> </a:t>
+            </a:r>
+            <a:r>
+              <a:rPr/>
+              <a:t>condition</a:t>
+            </a:r>
+            <a:r>
+              <a:rPr/>
+              <a:t> </a:t>
+            </a:r>
+            <a:r>
+              <a:rPr/>
+              <a:t>is,</a:t>
+            </a:r>
+            <a:r>
+              <a:rPr/>
+              <a:t> </a:t>
+            </a:r>
+            <a:r>
+              <a:rPr/>
+              <a:t>because</a:t>
             </a:r>
             <a:r>
               <a:rPr/>
@@ -9087,55 +8728,103 @@
             </a:r>
             <a:r>
               <a:rPr/>
-              <a:t>can’t</a:t>
-            </a:r>
-            <a:r>
-              <a:rPr/>
-              <a:t> </a:t>
-            </a:r>
-            <a:r>
-              <a:rPr/>
-              <a:t>say</a:t>
-            </a:r>
-            <a:r>
-              <a:rPr/>
-              <a:t> </a:t>
-            </a:r>
-            <a:r>
-              <a:rPr/>
-              <a:t>age</a:t>
-            </a:r>
-            <a:r>
-              <a:rPr/>
-              <a:t> </a:t>
-            </a:r>
-            <a:r>
-              <a:rPr/>
-              <a:t>&lt;=</a:t>
-            </a:r>
-            <a:r>
-              <a:rPr/>
-              <a:t> </a:t>
-            </a:r>
-            <a:r>
-              <a:rPr/>
-              <a:t>18,</a:t>
-            </a:r>
-            <a:r>
-              <a:rPr/>
-              <a:t> </a:t>
-            </a:r>
-            <a:r>
-              <a:rPr/>
-              <a:t>you</a:t>
-            </a:r>
-            <a:r>
-              <a:rPr/>
-              <a:t> </a:t>
-            </a:r>
-            <a:r>
-              <a:rPr/>
-              <a:t>have</a:t>
+              <a:t>already</a:t>
+            </a:r>
+            <a:r>
+              <a:rPr/>
+              <a:t> </a:t>
+            </a:r>
+            <a:r>
+              <a:rPr/>
+              <a:t>know</a:t>
+            </a:r>
+            <a:r>
+              <a:rPr/>
+              <a:t> </a:t>
+            </a:r>
+            <a:r>
+              <a:rPr/>
+              <a:t>based</a:t>
+            </a:r>
+            <a:r>
+              <a:rPr/>
+              <a:t> </a:t>
+            </a:r>
+            <a:r>
+              <a:rPr/>
+              <a:t>on</a:t>
+            </a:r>
+            <a:r>
+              <a:rPr/>
+              <a:t> </a:t>
+            </a:r>
+            <a:r>
+              <a:rPr/>
+              <a:t>the</a:t>
+            </a:r>
+            <a:r>
+              <a:rPr/>
+              <a:t> </a:t>
+            </a:r>
+            <a:r>
+              <a:rPr/>
+              <a:t>first</a:t>
+            </a:r>
+            <a:r>
+              <a:rPr/>
+              <a:t> </a:t>
+            </a:r>
+            <a:r>
+              <a:rPr/>
+              <a:t>condition</a:t>
+            </a:r>
+            <a:r>
+              <a:rPr/>
+              <a:t> </a:t>
+            </a:r>
+            <a:r>
+              <a:rPr/>
+              <a:t>that</a:t>
+            </a:r>
+            <a:r>
+              <a:rPr/>
+              <a:t> </a:t>
+            </a:r>
+            <a:r>
+              <a:rPr/>
+              <a:t>the</a:t>
+            </a:r>
+            <a:r>
+              <a:rPr/>
+              <a:t> </a:t>
+            </a:r>
+            <a:r>
+              <a:rPr/>
+              <a:t>entire</a:t>
+            </a:r>
+            <a:r>
+              <a:rPr/>
+              <a:t> </a:t>
+            </a:r>
+            <a:r>
+              <a:rPr/>
+              <a:t>Boolean</a:t>
+            </a:r>
+            <a:r>
+              <a:rPr/>
+              <a:t> </a:t>
+            </a:r>
+            <a:r>
+              <a:rPr/>
+              <a:t>statement</a:t>
+            </a:r>
+            <a:r>
+              <a:rPr/>
+              <a:t> </a:t>
+            </a:r>
+            <a:r>
+              <a:rPr/>
+              <a:t>has</a:t>
             </a:r>
             <a:r>
               <a:rPr/>
@@ -9151,55 +8840,23 @@
             </a:r>
             <a:r>
               <a:rPr/>
-              <a:t>say</a:t>
-            </a:r>
-            <a:r>
-              <a:rPr/>
-              <a:t> </a:t>
-            </a:r>
-            <a:r>
-              <a:rPr/>
-              <a:t>age</a:t>
-            </a:r>
-            <a:r>
-              <a:rPr/>
-              <a:t> </a:t>
-            </a:r>
-            <a:r>
-              <a:rPr/>
-              <a:t>&lt;=18</a:t>
-            </a:r>
-            <a:r>
-              <a:rPr/>
-              <a:t> </a:t>
-            </a:r>
-            <a:r>
-              <a:rPr/>
-              <a:t>and</a:t>
-            </a:r>
-            <a:r>
-              <a:rPr/>
-              <a:t> </a:t>
-            </a:r>
-            <a:r>
-              <a:rPr/>
-              <a:t>age</a:t>
-            </a:r>
-            <a:r>
-              <a:rPr/>
-              <a:t> </a:t>
-            </a:r>
-            <a:r>
-              <a:rPr/>
-              <a:t>&gt;=</a:t>
-            </a:r>
-            <a:r>
-              <a:rPr/>
-              <a:t> </a:t>
-            </a:r>
-            <a:r>
-              <a:rPr/>
-              <a:t>0.</a:t>
+              <a:t>evaluate</a:t>
+            </a:r>
+            <a:r>
+              <a:rPr/>
+              <a:t> </a:t>
+            </a:r>
+            <a:r>
+              <a:rPr/>
+              <a:t>to</a:t>
+            </a:r>
+            <a:r>
+              <a:rPr/>
+              <a:t> </a:t>
+            </a:r>
+            <a:r>
+              <a:rPr/>
+              <a:t>FALSE.</a:t>
             </a:r>
           </a:p>
           <a:p>
@@ -9213,15 +8870,151 @@
             </a:pPr>
             <a:r>
               <a:rPr/>
-              <a:t>Now</a:t>
-            </a:r>
-            <a:r>
-              <a:rPr/>
-              <a:t> </a:t>
-            </a:r>
-            <a:r>
-              <a:rPr/>
-              <a:t>as</a:t>
+              <a:t>The</a:t>
+            </a:r>
+            <a:r>
+              <a:rPr/>
+              <a:t> </a:t>
+            </a:r>
+            <a:r>
+              <a:rPr/>
+              <a:t>other</a:t>
+            </a:r>
+            <a:r>
+              <a:rPr/>
+              <a:t> </a:t>
+            </a:r>
+            <a:r>
+              <a:rPr/>
+              <a:t>case</a:t>
+            </a:r>
+            <a:r>
+              <a:rPr/>
+              <a:t> </a:t>
+            </a:r>
+            <a:r>
+              <a:rPr/>
+              <a:t>is</a:t>
+            </a:r>
+            <a:r>
+              <a:rPr/>
+              <a:t> </a:t>
+            </a:r>
+            <a:r>
+              <a:rPr/>
+              <a:t>a</a:t>
+            </a:r>
+            <a:r>
+              <a:rPr/>
+              <a:t> </a:t>
+            </a:r>
+            <a:r>
+              <a:rPr/>
+              <a:t>statement</a:t>
+            </a:r>
+            <a:r>
+              <a:rPr/>
+              <a:t> </a:t>
+            </a:r>
+            <a:r>
+              <a:rPr/>
+              <a:t>TRUE</a:t>
+            </a:r>
+            <a:r>
+              <a:rPr/>
+              <a:t> </a:t>
+            </a:r>
+            <a:r>
+              <a:rPr/>
+              <a:t>or</a:t>
+            </a:r>
+            <a:r>
+              <a:rPr/>
+              <a:t> </a:t>
+            </a:r>
+            <a:r>
+              <a:rPr/>
+              <a:t>UNKNOWN.</a:t>
+            </a:r>
+            <a:r>
+              <a:rPr/>
+              <a:t> </a:t>
+            </a:r>
+            <a:r>
+              <a:rPr/>
+              <a:t>Once</a:t>
+            </a:r>
+            <a:r>
+              <a:rPr/>
+              <a:t> </a:t>
+            </a:r>
+            <a:r>
+              <a:rPr/>
+              <a:t>you</a:t>
+            </a:r>
+            <a:r>
+              <a:rPr/>
+              <a:t> </a:t>
+            </a:r>
+            <a:r>
+              <a:rPr/>
+              <a:t>know</a:t>
+            </a:r>
+            <a:r>
+              <a:rPr/>
+              <a:t> </a:t>
+            </a:r>
+            <a:r>
+              <a:rPr/>
+              <a:t>that</a:t>
+            </a:r>
+            <a:r>
+              <a:rPr/>
+              <a:t> </a:t>
+            </a:r>
+            <a:r>
+              <a:rPr/>
+              <a:t>one</a:t>
+            </a:r>
+            <a:r>
+              <a:rPr/>
+              <a:t> </a:t>
+            </a:r>
+            <a:r>
+              <a:rPr/>
+              <a:t>of</a:t>
+            </a:r>
+            <a:r>
+              <a:rPr/>
+              <a:t> </a:t>
+            </a:r>
+            <a:r>
+              <a:rPr/>
+              <a:t>the</a:t>
+            </a:r>
+            <a:r>
+              <a:rPr/>
+              <a:t> </a:t>
+            </a:r>
+            <a:r>
+              <a:rPr/>
+              <a:t>two</a:t>
+            </a:r>
+            <a:r>
+              <a:rPr/>
+              <a:t> </a:t>
+            </a:r>
+            <a:r>
+              <a:rPr/>
+              <a:t>conditions</a:t>
+            </a:r>
+            <a:r>
+              <a:rPr/>
+              <a:t> </a:t>
+            </a:r>
+            <a:r>
+              <a:rPr/>
+              <a:t>in</a:t>
             </a:r>
             <a:r>
               <a:rPr/>
@@ -9237,6 +9030,244 @@
             </a:r>
             <a:r>
               <a:rPr/>
+              <a:t>OR</a:t>
+            </a:r>
+            <a:r>
+              <a:rPr/>
+              <a:t> </a:t>
+            </a:r>
+            <a:r>
+              <a:rPr/>
+              <a:t>statement</a:t>
+            </a:r>
+            <a:r>
+              <a:rPr/>
+              <a:t> </a:t>
+            </a:r>
+            <a:r>
+              <a:rPr/>
+              <a:t>is</a:t>
+            </a:r>
+            <a:r>
+              <a:rPr/>
+              <a:t> </a:t>
+            </a:r>
+            <a:r>
+              <a:rPr/>
+              <a:t>TRUE,</a:t>
+            </a:r>
+            <a:r>
+              <a:rPr/>
+              <a:t> </a:t>
+            </a:r>
+            <a:r>
+              <a:rPr/>
+              <a:t>you</a:t>
+            </a:r>
+            <a:r>
+              <a:rPr/>
+              <a:t> </a:t>
+            </a:r>
+            <a:r>
+              <a:rPr/>
+              <a:t>don’t</a:t>
+            </a:r>
+            <a:r>
+              <a:rPr/>
+              <a:t> </a:t>
+            </a:r>
+            <a:r>
+              <a:rPr/>
+              <a:t>have</a:t>
+            </a:r>
+            <a:r>
+              <a:rPr/>
+              <a:t> </a:t>
+            </a:r>
+            <a:r>
+              <a:rPr/>
+              <a:t>to</a:t>
+            </a:r>
+            <a:r>
+              <a:rPr/>
+              <a:t> </a:t>
+            </a:r>
+            <a:r>
+              <a:rPr/>
+              <a:t>bother</a:t>
+            </a:r>
+            <a:r>
+              <a:rPr/>
+              <a:t> </a:t>
+            </a:r>
+            <a:r>
+              <a:rPr/>
+              <a:t>evaluating</a:t>
+            </a:r>
+            <a:r>
+              <a:rPr/>
+              <a:t> </a:t>
+            </a:r>
+            <a:r>
+              <a:rPr/>
+              <a:t>the</a:t>
+            </a:r>
+            <a:r>
+              <a:rPr/>
+              <a:t> </a:t>
+            </a:r>
+            <a:r>
+              <a:rPr/>
+              <a:t>second.</a:t>
+            </a:r>
+          </a:p>
+          <a:p>
+            <a:pPr lvl="0" marL="0" indent="0">
+              <a:buNone/>
+            </a:pPr>
+          </a:p>
+          <a:p>
+            <a:pPr lvl="0" marL="0" indent="0">
+              <a:buNone/>
+            </a:pPr>
+            <a:r>
+              <a:rPr/>
+              <a:t>It’s</a:t>
+            </a:r>
+            <a:r>
+              <a:rPr/>
+              <a:t> </a:t>
+            </a:r>
+            <a:r>
+              <a:rPr/>
+              <a:t>kind</a:t>
+            </a:r>
+            <a:r>
+              <a:rPr/>
+              <a:t> </a:t>
+            </a:r>
+            <a:r>
+              <a:rPr/>
+              <a:t>of</a:t>
+            </a:r>
+            <a:r>
+              <a:rPr/>
+              <a:t> </a:t>
+            </a:r>
+            <a:r>
+              <a:rPr/>
+              <a:t>like</a:t>
+            </a:r>
+            <a:r>
+              <a:rPr/>
+              <a:t> </a:t>
+            </a:r>
+            <a:r>
+              <a:rPr/>
+              <a:t>multiplying</a:t>
+            </a:r>
+            <a:r>
+              <a:rPr/>
+              <a:t> </a:t>
+            </a:r>
+            <a:r>
+              <a:rPr/>
+              <a:t>an</a:t>
+            </a:r>
+            <a:r>
+              <a:rPr/>
+              <a:t> </a:t>
+            </a:r>
+            <a:r>
+              <a:rPr/>
+              <a:t>unknown</a:t>
+            </a:r>
+            <a:r>
+              <a:rPr/>
+              <a:t> </a:t>
+            </a:r>
+            <a:r>
+              <a:rPr/>
+              <a:t>number</a:t>
+            </a:r>
+            <a:r>
+              <a:rPr/>
+              <a:t> </a:t>
+            </a:r>
+            <a:r>
+              <a:rPr/>
+              <a:t>by</a:t>
+            </a:r>
+            <a:r>
+              <a:rPr/>
+              <a:t> </a:t>
+            </a:r>
+            <a:r>
+              <a:rPr/>
+              <a:t>zero.</a:t>
+            </a:r>
+            <a:r>
+              <a:rPr/>
+              <a:t> </a:t>
+            </a:r>
+            <a:r>
+              <a:rPr/>
+              <a:t>Any</a:t>
+            </a:r>
+            <a:r>
+              <a:rPr/>
+              <a:t> </a:t>
+            </a:r>
+            <a:r>
+              <a:rPr/>
+              <a:t>possible</a:t>
+            </a:r>
+            <a:r>
+              <a:rPr/>
+              <a:t> </a:t>
+            </a:r>
+            <a:r>
+              <a:rPr/>
+              <a:t>value</a:t>
+            </a:r>
+            <a:r>
+              <a:rPr/>
+              <a:t> </a:t>
+            </a:r>
+            <a:r>
+              <a:rPr/>
+              <a:t>for</a:t>
+            </a:r>
+            <a:r>
+              <a:rPr/>
+              <a:t> </a:t>
+            </a:r>
+            <a:r>
+              <a:rPr/>
+              <a:t>the</a:t>
+            </a:r>
+            <a:r>
+              <a:rPr/>
+              <a:t> </a:t>
+            </a:r>
+            <a:r>
+              <a:rPr/>
+              <a:t>unknown</a:t>
+            </a:r>
+            <a:r>
+              <a:rPr/>
+              <a:t> </a:t>
+            </a:r>
+            <a:r>
+              <a:rPr/>
+              <a:t>would</a:t>
+            </a:r>
+            <a:r>
+              <a:rPr/>
+              <a:t> </a:t>
+            </a:r>
+            <a:r>
+              <a:rPr/>
               <a:t>end</a:t>
             </a:r>
             <a:r>
@@ -9245,263 +9276,31 @@
             </a:r>
             <a:r>
               <a:rPr/>
-              <a:t>user,</a:t>
-            </a:r>
-            <a:r>
-              <a:rPr/>
-              <a:t> </a:t>
-            </a:r>
-            <a:r>
-              <a:rPr/>
-              <a:t>you</a:t>
-            </a:r>
-            <a:r>
-              <a:rPr/>
-              <a:t> </a:t>
-            </a:r>
-            <a:r>
-              <a:rPr/>
-              <a:t>don’t</a:t>
-            </a:r>
-            <a:r>
-              <a:rPr/>
-              <a:t> </a:t>
-            </a:r>
-            <a:r>
-              <a:rPr/>
-              <a:t>get</a:t>
-            </a:r>
-            <a:r>
-              <a:rPr/>
-              <a:t> </a:t>
-            </a:r>
-            <a:r>
-              <a:rPr/>
-              <a:t>to</a:t>
-            </a:r>
-            <a:r>
-              <a:rPr/>
-              <a:t> </a:t>
-            </a:r>
-            <a:r>
-              <a:rPr/>
-              <a:t>make</a:t>
-            </a:r>
-            <a:r>
-              <a:rPr/>
-              <a:t> </a:t>
-            </a:r>
-            <a:r>
-              <a:rPr/>
-              <a:t>this</a:t>
-            </a:r>
-            <a:r>
-              <a:rPr/>
-              <a:t> </a:t>
-            </a:r>
-            <a:r>
-              <a:rPr/>
-              <a:t>call.</a:t>
-            </a:r>
-            <a:r>
-              <a:rPr/>
-              <a:t> </a:t>
-            </a:r>
-            <a:r>
-              <a:rPr/>
-              <a:t>The</a:t>
-            </a:r>
-            <a:r>
-              <a:rPr/>
-              <a:t> </a:t>
-            </a:r>
-            <a:r>
-              <a:rPr/>
-              <a:t>lesson</a:t>
-            </a:r>
-            <a:r>
-              <a:rPr/>
-              <a:t> </a:t>
-            </a:r>
-            <a:r>
-              <a:rPr/>
-              <a:t>for</a:t>
-            </a:r>
-            <a:r>
-              <a:rPr/>
-              <a:t> </a:t>
-            </a:r>
-            <a:r>
-              <a:rPr/>
-              <a:t>you</a:t>
-            </a:r>
-            <a:r>
-              <a:rPr/>
-              <a:t> </a:t>
-            </a:r>
-            <a:r>
-              <a:rPr/>
-              <a:t>is</a:t>
-            </a:r>
-            <a:r>
-              <a:rPr/>
-              <a:t> </a:t>
-            </a:r>
-            <a:r>
-              <a:rPr/>
-              <a:t>that</a:t>
-            </a:r>
-            <a:r>
-              <a:rPr/>
-              <a:t> </a:t>
-            </a:r>
-            <a:r>
-              <a:rPr/>
-              <a:t>whenever</a:t>
-            </a:r>
-            <a:r>
-              <a:rPr/>
-              <a:t> </a:t>
-            </a:r>
-            <a:r>
-              <a:rPr/>
-              <a:t>you</a:t>
-            </a:r>
-            <a:r>
-              <a:rPr/>
-              <a:t> </a:t>
-            </a:r>
-            <a:r>
-              <a:rPr/>
-              <a:t>have</a:t>
-            </a:r>
-            <a:r>
-              <a:rPr/>
-              <a:t> </a:t>
-            </a:r>
-            <a:r>
-              <a:rPr/>
-              <a:t>missing</a:t>
-            </a:r>
-            <a:r>
-              <a:rPr/>
-              <a:t> </a:t>
-            </a:r>
-            <a:r>
-              <a:rPr/>
-              <a:t>or</a:t>
-            </a:r>
-            <a:r>
-              <a:rPr/>
-              <a:t> </a:t>
-            </a:r>
-            <a:r>
-              <a:rPr/>
-              <a:t>unknown</a:t>
-            </a:r>
-            <a:r>
-              <a:rPr/>
-              <a:t> </a:t>
-            </a:r>
-            <a:r>
-              <a:rPr/>
-              <a:t>values,</a:t>
-            </a:r>
-            <a:r>
-              <a:rPr/>
-              <a:t> </a:t>
-            </a:r>
-            <a:r>
-              <a:rPr/>
-              <a:t>you</a:t>
-            </a:r>
-            <a:r>
-              <a:rPr/>
-              <a:t> </a:t>
-            </a:r>
-            <a:r>
-              <a:rPr/>
-              <a:t>have</a:t>
-            </a:r>
-            <a:r>
-              <a:rPr/>
-              <a:t> </a:t>
-            </a:r>
-            <a:r>
-              <a:rPr/>
-              <a:t>to</a:t>
-            </a:r>
-            <a:r>
-              <a:rPr/>
-              <a:t> </a:t>
-            </a:r>
-            <a:r>
-              <a:rPr/>
-              <a:t>be</a:t>
-            </a:r>
-            <a:r>
-              <a:rPr/>
-              <a:t> </a:t>
-            </a:r>
-            <a:r>
-              <a:rPr/>
-              <a:t>alert</a:t>
-            </a:r>
-            <a:r>
-              <a:rPr/>
-              <a:t> </a:t>
-            </a:r>
-            <a:r>
-              <a:rPr/>
-              <a:t>to</a:t>
-            </a:r>
-            <a:r>
-              <a:rPr/>
-              <a:t> </a:t>
-            </a:r>
-            <a:r>
-              <a:rPr/>
-              <a:t>the</a:t>
-            </a:r>
-            <a:r>
-              <a:rPr/>
-              <a:t> </a:t>
-            </a:r>
-            <a:r>
-              <a:rPr/>
-              <a:t>troubles</a:t>
-            </a:r>
-            <a:r>
-              <a:rPr/>
-              <a:t> </a:t>
-            </a:r>
-            <a:r>
-              <a:rPr/>
-              <a:t>that</a:t>
-            </a:r>
-            <a:r>
-              <a:rPr/>
-              <a:t> </a:t>
-            </a:r>
-            <a:r>
-              <a:rPr/>
-              <a:t>they</a:t>
-            </a:r>
-            <a:r>
-              <a:rPr/>
-              <a:t> </a:t>
-            </a:r>
-            <a:r>
-              <a:rPr/>
-              <a:t>may</a:t>
-            </a:r>
-            <a:r>
-              <a:rPr/>
-              <a:t> </a:t>
-            </a:r>
-            <a:r>
-              <a:rPr/>
-              <a:t>cause.</a:t>
+              <a:t>up</a:t>
+            </a:r>
+            <a:r>
+              <a:rPr/>
+              <a:t> </a:t>
+            </a:r>
+            <a:r>
+              <a:rPr/>
+              <a:t>being</a:t>
+            </a:r>
+            <a:r>
+              <a:rPr/>
+              <a:t> </a:t>
+            </a:r>
+            <a:r>
+              <a:rPr/>
+              <a:t>zeroed</a:t>
+            </a:r>
+            <a:r>
+              <a:rPr/>
+              <a:t> </a:t>
+            </a:r>
+            <a:r>
+              <a:rPr/>
+              <a:t>out.</a:t>
             </a:r>
           </a:p>
         </p:txBody>
@@ -9524,6 +9323,1188 @@
             <a:fld id="{18BDFEC3-8487-43E8-A154-7C12CBC1FFF2}" type="slidenum">
               <a:rPr lang="en-US"/>
               <a:t>24</a:t>
+            </a:fld>
+            <a:endParaRPr lang="en-US"/>
+          </a:p>
+        </p:txBody>
+      </p:sp>
+    </p:spTree>
+  </p:cSld>
+</p:notes>
+</file>
+
+<file path=ppt/notesSlides/notesSlide22.xml><?xml version="1.0" encoding="utf-8"?>
+<p:notes xmlns:a="http://schemas.openxmlformats.org/drawingml/2006/main" xmlns:r="http://schemas.openxmlformats.org/officeDocument/2006/relationships" xmlns:p="http://schemas.openxmlformats.org/presentationml/2006/main">
+  <p:cSld>
+    <p:spTree>
+      <p:nvGrpSpPr>
+        <p:cNvPr id="1" name=""/>
+        <p:cNvGrpSpPr/>
+        <p:nvPr/>
+      </p:nvGrpSpPr>
+      <p:grpSpPr>
+        <a:xfrm>
+          <a:off x="0" y="0"/>
+          <a:ext cx="0" cy="0"/>
+          <a:chOff x="0" y="0"/>
+          <a:chExt cx="0" cy="0"/>
+        </a:xfrm>
+      </p:grpSpPr>
+      <p:sp>
+        <p:nvSpPr>
+          <p:cNvPr id="2" name="Slide Image Placeholder 1"/>
+          <p:cNvSpPr>
+            <a:spLocks noGrp="1" noRot="1" noChangeAspect="1"/>
+          </p:cNvSpPr>
+          <p:nvPr>
+            <p:ph type="sldImg"/>
+          </p:nvPr>
+        </p:nvSpPr>
+        <p:spPr/>
+      </p:sp>
+      <p:sp>
+        <p:nvSpPr>
+          <p:cNvPr id="3" name="Notes Placeholder 2"/>
+          <p:cNvSpPr>
+            <a:spLocks noGrp="1"/>
+          </p:cNvSpPr>
+          <p:nvPr>
+            <p:ph type="body" idx="1"/>
+          </p:nvPr>
+        </p:nvSpPr>
+        <p:spPr/>
+        <p:txBody>
+          <a:bodyPr/>
+          <a:lstStyle/>
+          <a:p>
+            <a:pPr lvl="0" marL="0" indent="0">
+              <a:buNone/>
+            </a:pPr>
+            <a:r>
+              <a:rPr/>
+              <a:t>There</a:t>
+            </a:r>
+            <a:r>
+              <a:rPr/>
+              <a:t> </a:t>
+            </a:r>
+            <a:r>
+              <a:rPr/>
+              <a:t>is</a:t>
+            </a:r>
+            <a:r>
+              <a:rPr/>
+              <a:t> </a:t>
+            </a:r>
+            <a:r>
+              <a:rPr/>
+              <a:t>a</a:t>
+            </a:r>
+            <a:r>
+              <a:rPr/>
+              <a:t> </a:t>
+            </a:r>
+            <a:r>
+              <a:rPr/>
+              <a:t>strong</a:t>
+            </a:r>
+            <a:r>
+              <a:rPr/>
+              <a:t> </a:t>
+            </a:r>
+            <a:r>
+              <a:rPr/>
+              <a:t>debate</a:t>
+            </a:r>
+            <a:r>
+              <a:rPr/>
+              <a:t> </a:t>
+            </a:r>
+            <a:r>
+              <a:rPr/>
+              <a:t>about</a:t>
+            </a:r>
+            <a:r>
+              <a:rPr/>
+              <a:t> </a:t>
+            </a:r>
+            <a:r>
+              <a:rPr/>
+              <a:t>whether</a:t>
+            </a:r>
+            <a:r>
+              <a:rPr/>
+              <a:t> </a:t>
+            </a:r>
+            <a:r>
+              <a:rPr/>
+              <a:t>you</a:t>
+            </a:r>
+            <a:r>
+              <a:rPr/>
+              <a:t> </a:t>
+            </a:r>
+            <a:r>
+              <a:rPr/>
+              <a:t>should</a:t>
+            </a:r>
+            <a:r>
+              <a:rPr/>
+              <a:t> </a:t>
+            </a:r>
+            <a:r>
+              <a:rPr/>
+              <a:t>use</a:t>
+            </a:r>
+            <a:r>
+              <a:rPr/>
+              <a:t> </a:t>
+            </a:r>
+            <a:r>
+              <a:rPr/>
+              <a:t>null</a:t>
+            </a:r>
+            <a:r>
+              <a:rPr/>
+              <a:t> </a:t>
+            </a:r>
+            <a:r>
+              <a:rPr/>
+              <a:t>values</a:t>
+            </a:r>
+            <a:r>
+              <a:rPr/>
+              <a:t> </a:t>
+            </a:r>
+            <a:r>
+              <a:rPr/>
+              <a:t>at</a:t>
+            </a:r>
+            <a:r>
+              <a:rPr/>
+              <a:t> </a:t>
+            </a:r>
+            <a:r>
+              <a:rPr/>
+              <a:t>all</a:t>
+            </a:r>
+            <a:r>
+              <a:rPr/>
+              <a:t> </a:t>
+            </a:r>
+            <a:r>
+              <a:rPr/>
+              <a:t>in</a:t>
+            </a:r>
+            <a:r>
+              <a:rPr/>
+              <a:t> </a:t>
+            </a:r>
+            <a:r>
+              <a:rPr/>
+              <a:t>databases.</a:t>
+            </a:r>
+            <a:r>
+              <a:rPr/>
+              <a:t> </a:t>
+            </a:r>
+            <a:r>
+              <a:rPr/>
+              <a:t>The</a:t>
+            </a:r>
+            <a:r>
+              <a:rPr/>
+              <a:t> </a:t>
+            </a:r>
+            <a:r>
+              <a:rPr/>
+              <a:t>potential</a:t>
+            </a:r>
+            <a:r>
+              <a:rPr/>
+              <a:t> </a:t>
+            </a:r>
+            <a:r>
+              <a:rPr/>
+              <a:t>for</a:t>
+            </a:r>
+            <a:r>
+              <a:rPr/>
+              <a:t> </a:t>
+            </a:r>
+            <a:r>
+              <a:rPr/>
+              <a:t>confusion</a:t>
+            </a:r>
+            <a:r>
+              <a:rPr/>
+              <a:t> </a:t>
+            </a:r>
+            <a:r>
+              <a:rPr/>
+              <a:t>is</a:t>
+            </a:r>
+            <a:r>
+              <a:rPr/>
+              <a:t> </a:t>
+            </a:r>
+            <a:r>
+              <a:rPr/>
+              <a:t>great.</a:t>
+            </a:r>
+            <a:r>
+              <a:rPr/>
+              <a:t> </a:t>
+            </a:r>
+            <a:r>
+              <a:rPr/>
+              <a:t>There</a:t>
+            </a:r>
+            <a:r>
+              <a:rPr/>
+              <a:t> </a:t>
+            </a:r>
+            <a:r>
+              <a:rPr/>
+              <a:t>is</a:t>
+            </a:r>
+            <a:r>
+              <a:rPr/>
+              <a:t> </a:t>
+            </a:r>
+            <a:r>
+              <a:rPr/>
+              <a:t>a</a:t>
+            </a:r>
+            <a:r>
+              <a:rPr/>
+              <a:t> </a:t>
+            </a:r>
+            <a:r>
+              <a:rPr/>
+              <a:t>general</a:t>
+            </a:r>
+            <a:r>
+              <a:rPr/>
+              <a:t> </a:t>
+            </a:r>
+            <a:r>
+              <a:rPr/>
+              <a:t>consensus</a:t>
+            </a:r>
+            <a:r>
+              <a:rPr/>
+              <a:t> </a:t>
+            </a:r>
+            <a:r>
+              <a:rPr/>
+              <a:t>that</a:t>
+            </a:r>
+            <a:r>
+              <a:rPr/>
+              <a:t> </a:t>
+            </a:r>
+            <a:r>
+              <a:rPr/>
+              <a:t>you</a:t>
+            </a:r>
+            <a:r>
+              <a:rPr/>
+              <a:t> </a:t>
+            </a:r>
+            <a:r>
+              <a:rPr/>
+              <a:t>should</a:t>
+            </a:r>
+            <a:r>
+              <a:rPr/>
+              <a:t> </a:t>
+            </a:r>
+            <a:r>
+              <a:rPr/>
+              <a:t>not</a:t>
+            </a:r>
+            <a:r>
+              <a:rPr/>
+              <a:t> </a:t>
+            </a:r>
+            <a:r>
+              <a:rPr/>
+              <a:t>use</a:t>
+            </a:r>
+            <a:r>
+              <a:rPr/>
+              <a:t> </a:t>
+            </a:r>
+            <a:r>
+              <a:rPr/>
+              <a:t>null</a:t>
+            </a:r>
+            <a:r>
+              <a:rPr/>
+              <a:t> </a:t>
+            </a:r>
+            <a:r>
+              <a:rPr/>
+              <a:t>values</a:t>
+            </a:r>
+            <a:r>
+              <a:rPr/>
+              <a:t> </a:t>
+            </a:r>
+            <a:r>
+              <a:rPr/>
+              <a:t>for</a:t>
+            </a:r>
+            <a:r>
+              <a:rPr/>
+              <a:t> </a:t>
+            </a:r>
+            <a:r>
+              <a:rPr/>
+              <a:t>identification</a:t>
+            </a:r>
+            <a:r>
+              <a:rPr/>
+              <a:t> </a:t>
+            </a:r>
+            <a:r>
+              <a:rPr/>
+              <a:t>codes.</a:t>
+            </a:r>
+            <a:r>
+              <a:rPr/>
+              <a:t> </a:t>
+            </a:r>
+            <a:r>
+              <a:rPr/>
+              <a:t>For</a:t>
+            </a:r>
+            <a:r>
+              <a:rPr/>
+              <a:t> </a:t>
+            </a:r>
+            <a:r>
+              <a:rPr/>
+              <a:t>other</a:t>
+            </a:r>
+            <a:r>
+              <a:rPr/>
+              <a:t> </a:t>
+            </a:r>
+            <a:r>
+              <a:rPr/>
+              <a:t>settings,</a:t>
+            </a:r>
+            <a:r>
+              <a:rPr/>
+              <a:t> </a:t>
+            </a:r>
+            <a:r>
+              <a:rPr/>
+              <a:t>you</a:t>
+            </a:r>
+            <a:r>
+              <a:rPr/>
+              <a:t> </a:t>
+            </a:r>
+            <a:r>
+              <a:rPr/>
+              <a:t>can</a:t>
+            </a:r>
+            <a:r>
+              <a:rPr/>
+              <a:t> </a:t>
+            </a:r>
+            <a:r>
+              <a:rPr/>
+              <a:t>use</a:t>
+            </a:r>
+            <a:r>
+              <a:rPr/>
+              <a:t> </a:t>
+            </a:r>
+            <a:r>
+              <a:rPr/>
+              <a:t>extreme</a:t>
+            </a:r>
+            <a:r>
+              <a:rPr/>
+              <a:t> </a:t>
+            </a:r>
+            <a:r>
+              <a:rPr/>
+              <a:t>codes</a:t>
+            </a:r>
+            <a:r>
+              <a:rPr/>
+              <a:t> </a:t>
+            </a:r>
+            <a:r>
+              <a:rPr/>
+              <a:t>like</a:t>
+            </a:r>
+            <a:r>
+              <a:rPr/>
+              <a:t> </a:t>
+            </a:r>
+            <a:r>
+              <a:rPr/>
+              <a:t>-1</a:t>
+            </a:r>
+            <a:r>
+              <a:rPr/>
+              <a:t> </a:t>
+            </a:r>
+            <a:r>
+              <a:rPr/>
+              <a:t>and</a:t>
+            </a:r>
+            <a:r>
+              <a:rPr/>
+              <a:t> </a:t>
+            </a:r>
+            <a:r>
+              <a:rPr/>
+              <a:t>99.</a:t>
+            </a:r>
+            <a:r>
+              <a:rPr/>
+              <a:t> </a:t>
+            </a:r>
+            <a:r>
+              <a:rPr/>
+              <a:t>Then</a:t>
+            </a:r>
+            <a:r>
+              <a:rPr/>
+              <a:t> </a:t>
+            </a:r>
+            <a:r>
+              <a:rPr/>
+              <a:t>you</a:t>
+            </a:r>
+            <a:r>
+              <a:rPr/>
+              <a:t> </a:t>
+            </a:r>
+            <a:r>
+              <a:rPr/>
+              <a:t>can</a:t>
+            </a:r>
+            <a:r>
+              <a:rPr/>
+              <a:t> </a:t>
+            </a:r>
+            <a:r>
+              <a:rPr/>
+              <a:t>track</a:t>
+            </a:r>
+            <a:r>
+              <a:rPr/>
+              <a:t> </a:t>
+            </a:r>
+            <a:r>
+              <a:rPr/>
+              <a:t>those</a:t>
+            </a:r>
+            <a:r>
+              <a:rPr/>
+              <a:t> </a:t>
+            </a:r>
+            <a:r>
+              <a:rPr/>
+              <a:t>codes</a:t>
+            </a:r>
+            <a:r>
+              <a:rPr/>
+              <a:t> </a:t>
+            </a:r>
+            <a:r>
+              <a:rPr/>
+              <a:t>explicitly</a:t>
+            </a:r>
+            <a:r>
+              <a:rPr/>
+              <a:t> </a:t>
+            </a:r>
+            <a:r>
+              <a:rPr/>
+              <a:t>because</a:t>
+            </a:r>
+            <a:r>
+              <a:rPr/>
+              <a:t> </a:t>
+            </a:r>
+            <a:r>
+              <a:rPr/>
+              <a:t>=-1</a:t>
+            </a:r>
+            <a:r>
+              <a:rPr/>
+              <a:t> </a:t>
+            </a:r>
+            <a:r>
+              <a:rPr/>
+              <a:t>or</a:t>
+            </a:r>
+            <a:r>
+              <a:rPr/>
+              <a:t> </a:t>
+            </a:r>
+            <a:r>
+              <a:rPr/>
+              <a:t>=99</a:t>
+            </a:r>
+            <a:r>
+              <a:rPr/>
+              <a:t> </a:t>
+            </a:r>
+            <a:r>
+              <a:rPr/>
+              <a:t>does</a:t>
+            </a:r>
+            <a:r>
+              <a:rPr/>
+              <a:t> </a:t>
+            </a:r>
+            <a:r>
+              <a:rPr/>
+              <a:t>not</a:t>
+            </a:r>
+            <a:r>
+              <a:rPr/>
+              <a:t> </a:t>
+            </a:r>
+            <a:r>
+              <a:rPr/>
+              <a:t>invoke</a:t>
+            </a:r>
+            <a:r>
+              <a:rPr/>
+              <a:t> </a:t>
+            </a:r>
+            <a:r>
+              <a:rPr/>
+              <a:t>the</a:t>
+            </a:r>
+            <a:r>
+              <a:rPr/>
+              <a:t> </a:t>
+            </a:r>
+            <a:r>
+              <a:rPr/>
+              <a:t>monster</a:t>
+            </a:r>
+            <a:r>
+              <a:rPr/>
+              <a:t> </a:t>
+            </a:r>
+            <a:r>
+              <a:rPr/>
+              <a:t>of</a:t>
+            </a:r>
+            <a:r>
+              <a:rPr/>
+              <a:t> </a:t>
+            </a:r>
+            <a:r>
+              <a:rPr/>
+              <a:t>three</a:t>
+            </a:r>
+            <a:r>
+              <a:rPr/>
+              <a:t> </a:t>
+            </a:r>
+            <a:r>
+              <a:rPr/>
+              <a:t>valued</a:t>
+            </a:r>
+            <a:r>
+              <a:rPr/>
+              <a:t> </a:t>
+            </a:r>
+            <a:r>
+              <a:rPr/>
+              <a:t>logic.</a:t>
+            </a:r>
+          </a:p>
+          <a:p>
+            <a:pPr lvl="0" marL="0" indent="0">
+              <a:buNone/>
+            </a:pPr>
+          </a:p>
+          <a:p>
+            <a:pPr lvl="0" marL="0" indent="0">
+              <a:buNone/>
+            </a:pPr>
+            <a:r>
+              <a:rPr/>
+              <a:t>It</a:t>
+            </a:r>
+            <a:r>
+              <a:rPr/>
+              <a:t> </a:t>
+            </a:r>
+            <a:r>
+              <a:rPr/>
+              <a:t>is</a:t>
+            </a:r>
+            <a:r>
+              <a:rPr/>
+              <a:t> </a:t>
+            </a:r>
+            <a:r>
+              <a:rPr/>
+              <a:t>still</a:t>
+            </a:r>
+            <a:r>
+              <a:rPr/>
+              <a:t> </a:t>
+            </a:r>
+            <a:r>
+              <a:rPr/>
+              <a:t>tricky</a:t>
+            </a:r>
+            <a:r>
+              <a:rPr/>
+              <a:t> </a:t>
+            </a:r>
+            <a:r>
+              <a:rPr/>
+              <a:t>though.</a:t>
+            </a:r>
+            <a:r>
+              <a:rPr/>
+              <a:t> </a:t>
+            </a:r>
+            <a:r>
+              <a:rPr/>
+              <a:t>If</a:t>
+            </a:r>
+            <a:r>
+              <a:rPr/>
+              <a:t> </a:t>
+            </a:r>
+            <a:r>
+              <a:rPr/>
+              <a:t>the</a:t>
+            </a:r>
+            <a:r>
+              <a:rPr/>
+              <a:t> </a:t>
+            </a:r>
+            <a:r>
+              <a:rPr/>
+              <a:t>missing</a:t>
+            </a:r>
+            <a:r>
+              <a:rPr/>
+              <a:t> </a:t>
+            </a:r>
+            <a:r>
+              <a:rPr/>
+              <a:t>value</a:t>
+            </a:r>
+            <a:r>
+              <a:rPr/>
+              <a:t> </a:t>
+            </a:r>
+            <a:r>
+              <a:rPr/>
+              <a:t>code</a:t>
+            </a:r>
+            <a:r>
+              <a:rPr/>
+              <a:t> </a:t>
+            </a:r>
+            <a:r>
+              <a:rPr/>
+              <a:t>for</a:t>
+            </a:r>
+            <a:r>
+              <a:rPr/>
+              <a:t> </a:t>
+            </a:r>
+            <a:r>
+              <a:rPr/>
+              <a:t>age</a:t>
+            </a:r>
+            <a:r>
+              <a:rPr/>
+              <a:t> </a:t>
+            </a:r>
+            <a:r>
+              <a:rPr/>
+              <a:t>is</a:t>
+            </a:r>
+            <a:r>
+              <a:rPr/>
+              <a:t> </a:t>
+            </a:r>
+            <a:r>
+              <a:rPr/>
+              <a:t>-1</a:t>
+            </a:r>
+            <a:r>
+              <a:rPr/>
+              <a:t> </a:t>
+            </a:r>
+            <a:r>
+              <a:rPr/>
+              <a:t>then</a:t>
+            </a:r>
+            <a:r>
+              <a:rPr/>
+              <a:t> </a:t>
+            </a:r>
+            <a:r>
+              <a:rPr/>
+              <a:t>you</a:t>
+            </a:r>
+            <a:r>
+              <a:rPr/>
+              <a:t> </a:t>
+            </a:r>
+            <a:r>
+              <a:rPr/>
+              <a:t>can’t</a:t>
+            </a:r>
+            <a:r>
+              <a:rPr/>
+              <a:t> </a:t>
+            </a:r>
+            <a:r>
+              <a:rPr/>
+              <a:t>say</a:t>
+            </a:r>
+            <a:r>
+              <a:rPr/>
+              <a:t> </a:t>
+            </a:r>
+            <a:r>
+              <a:rPr/>
+              <a:t>age</a:t>
+            </a:r>
+            <a:r>
+              <a:rPr/>
+              <a:t> </a:t>
+            </a:r>
+            <a:r>
+              <a:rPr/>
+              <a:t>&lt;=</a:t>
+            </a:r>
+            <a:r>
+              <a:rPr/>
+              <a:t> </a:t>
+            </a:r>
+            <a:r>
+              <a:rPr/>
+              <a:t>18,</a:t>
+            </a:r>
+            <a:r>
+              <a:rPr/>
+              <a:t> </a:t>
+            </a:r>
+            <a:r>
+              <a:rPr/>
+              <a:t>you</a:t>
+            </a:r>
+            <a:r>
+              <a:rPr/>
+              <a:t> </a:t>
+            </a:r>
+            <a:r>
+              <a:rPr/>
+              <a:t>have</a:t>
+            </a:r>
+            <a:r>
+              <a:rPr/>
+              <a:t> </a:t>
+            </a:r>
+            <a:r>
+              <a:rPr/>
+              <a:t>to</a:t>
+            </a:r>
+            <a:r>
+              <a:rPr/>
+              <a:t> </a:t>
+            </a:r>
+            <a:r>
+              <a:rPr/>
+              <a:t>say</a:t>
+            </a:r>
+            <a:r>
+              <a:rPr/>
+              <a:t> </a:t>
+            </a:r>
+            <a:r>
+              <a:rPr/>
+              <a:t>age</a:t>
+            </a:r>
+            <a:r>
+              <a:rPr/>
+              <a:t> </a:t>
+            </a:r>
+            <a:r>
+              <a:rPr/>
+              <a:t>&lt;=18</a:t>
+            </a:r>
+            <a:r>
+              <a:rPr/>
+              <a:t> </a:t>
+            </a:r>
+            <a:r>
+              <a:rPr/>
+              <a:t>and</a:t>
+            </a:r>
+            <a:r>
+              <a:rPr/>
+              <a:t> </a:t>
+            </a:r>
+            <a:r>
+              <a:rPr/>
+              <a:t>age</a:t>
+            </a:r>
+            <a:r>
+              <a:rPr/>
+              <a:t> </a:t>
+            </a:r>
+            <a:r>
+              <a:rPr/>
+              <a:t>&gt;=</a:t>
+            </a:r>
+            <a:r>
+              <a:rPr/>
+              <a:t> </a:t>
+            </a:r>
+            <a:r>
+              <a:rPr/>
+              <a:t>0.</a:t>
+            </a:r>
+          </a:p>
+          <a:p>
+            <a:pPr lvl="0" marL="0" indent="0">
+              <a:buNone/>
+            </a:pPr>
+          </a:p>
+          <a:p>
+            <a:pPr lvl="0" marL="0" indent="0">
+              <a:buNone/>
+            </a:pPr>
+            <a:r>
+              <a:rPr/>
+              <a:t>Now</a:t>
+            </a:r>
+            <a:r>
+              <a:rPr/>
+              <a:t> </a:t>
+            </a:r>
+            <a:r>
+              <a:rPr/>
+              <a:t>as</a:t>
+            </a:r>
+            <a:r>
+              <a:rPr/>
+              <a:t> </a:t>
+            </a:r>
+            <a:r>
+              <a:rPr/>
+              <a:t>an</a:t>
+            </a:r>
+            <a:r>
+              <a:rPr/>
+              <a:t> </a:t>
+            </a:r>
+            <a:r>
+              <a:rPr/>
+              <a:t>end</a:t>
+            </a:r>
+            <a:r>
+              <a:rPr/>
+              <a:t> </a:t>
+            </a:r>
+            <a:r>
+              <a:rPr/>
+              <a:t>user,</a:t>
+            </a:r>
+            <a:r>
+              <a:rPr/>
+              <a:t> </a:t>
+            </a:r>
+            <a:r>
+              <a:rPr/>
+              <a:t>you</a:t>
+            </a:r>
+            <a:r>
+              <a:rPr/>
+              <a:t> </a:t>
+            </a:r>
+            <a:r>
+              <a:rPr/>
+              <a:t>don’t</a:t>
+            </a:r>
+            <a:r>
+              <a:rPr/>
+              <a:t> </a:t>
+            </a:r>
+            <a:r>
+              <a:rPr/>
+              <a:t>get</a:t>
+            </a:r>
+            <a:r>
+              <a:rPr/>
+              <a:t> </a:t>
+            </a:r>
+            <a:r>
+              <a:rPr/>
+              <a:t>to</a:t>
+            </a:r>
+            <a:r>
+              <a:rPr/>
+              <a:t> </a:t>
+            </a:r>
+            <a:r>
+              <a:rPr/>
+              <a:t>make</a:t>
+            </a:r>
+            <a:r>
+              <a:rPr/>
+              <a:t> </a:t>
+            </a:r>
+            <a:r>
+              <a:rPr/>
+              <a:t>this</a:t>
+            </a:r>
+            <a:r>
+              <a:rPr/>
+              <a:t> </a:t>
+            </a:r>
+            <a:r>
+              <a:rPr/>
+              <a:t>call.</a:t>
+            </a:r>
+            <a:r>
+              <a:rPr/>
+              <a:t> </a:t>
+            </a:r>
+            <a:r>
+              <a:rPr/>
+              <a:t>The</a:t>
+            </a:r>
+            <a:r>
+              <a:rPr/>
+              <a:t> </a:t>
+            </a:r>
+            <a:r>
+              <a:rPr/>
+              <a:t>lesson</a:t>
+            </a:r>
+            <a:r>
+              <a:rPr/>
+              <a:t> </a:t>
+            </a:r>
+            <a:r>
+              <a:rPr/>
+              <a:t>for</a:t>
+            </a:r>
+            <a:r>
+              <a:rPr/>
+              <a:t> </a:t>
+            </a:r>
+            <a:r>
+              <a:rPr/>
+              <a:t>you</a:t>
+            </a:r>
+            <a:r>
+              <a:rPr/>
+              <a:t> </a:t>
+            </a:r>
+            <a:r>
+              <a:rPr/>
+              <a:t>is</a:t>
+            </a:r>
+            <a:r>
+              <a:rPr/>
+              <a:t> </a:t>
+            </a:r>
+            <a:r>
+              <a:rPr/>
+              <a:t>that</a:t>
+            </a:r>
+            <a:r>
+              <a:rPr/>
+              <a:t> </a:t>
+            </a:r>
+            <a:r>
+              <a:rPr/>
+              <a:t>whenever</a:t>
+            </a:r>
+            <a:r>
+              <a:rPr/>
+              <a:t> </a:t>
+            </a:r>
+            <a:r>
+              <a:rPr/>
+              <a:t>you</a:t>
+            </a:r>
+            <a:r>
+              <a:rPr/>
+              <a:t> </a:t>
+            </a:r>
+            <a:r>
+              <a:rPr/>
+              <a:t>have</a:t>
+            </a:r>
+            <a:r>
+              <a:rPr/>
+              <a:t> </a:t>
+            </a:r>
+            <a:r>
+              <a:rPr/>
+              <a:t>missing</a:t>
+            </a:r>
+            <a:r>
+              <a:rPr/>
+              <a:t> </a:t>
+            </a:r>
+            <a:r>
+              <a:rPr/>
+              <a:t>or</a:t>
+            </a:r>
+            <a:r>
+              <a:rPr/>
+              <a:t> </a:t>
+            </a:r>
+            <a:r>
+              <a:rPr/>
+              <a:t>unknown</a:t>
+            </a:r>
+            <a:r>
+              <a:rPr/>
+              <a:t> </a:t>
+            </a:r>
+            <a:r>
+              <a:rPr/>
+              <a:t>values,</a:t>
+            </a:r>
+            <a:r>
+              <a:rPr/>
+              <a:t> </a:t>
+            </a:r>
+            <a:r>
+              <a:rPr/>
+              <a:t>you</a:t>
+            </a:r>
+            <a:r>
+              <a:rPr/>
+              <a:t> </a:t>
+            </a:r>
+            <a:r>
+              <a:rPr/>
+              <a:t>have</a:t>
+            </a:r>
+            <a:r>
+              <a:rPr/>
+              <a:t> </a:t>
+            </a:r>
+            <a:r>
+              <a:rPr/>
+              <a:t>to</a:t>
+            </a:r>
+            <a:r>
+              <a:rPr/>
+              <a:t> </a:t>
+            </a:r>
+            <a:r>
+              <a:rPr/>
+              <a:t>be</a:t>
+            </a:r>
+            <a:r>
+              <a:rPr/>
+              <a:t> </a:t>
+            </a:r>
+            <a:r>
+              <a:rPr/>
+              <a:t>alert</a:t>
+            </a:r>
+            <a:r>
+              <a:rPr/>
+              <a:t> </a:t>
+            </a:r>
+            <a:r>
+              <a:rPr/>
+              <a:t>to</a:t>
+            </a:r>
+            <a:r>
+              <a:rPr/>
+              <a:t> </a:t>
+            </a:r>
+            <a:r>
+              <a:rPr/>
+              <a:t>the</a:t>
+            </a:r>
+            <a:r>
+              <a:rPr/>
+              <a:t> </a:t>
+            </a:r>
+            <a:r>
+              <a:rPr/>
+              <a:t>troubles</a:t>
+            </a:r>
+            <a:r>
+              <a:rPr/>
+              <a:t> </a:t>
+            </a:r>
+            <a:r>
+              <a:rPr/>
+              <a:t>that</a:t>
+            </a:r>
+            <a:r>
+              <a:rPr/>
+              <a:t> </a:t>
+            </a:r>
+            <a:r>
+              <a:rPr/>
+              <a:t>they</a:t>
+            </a:r>
+            <a:r>
+              <a:rPr/>
+              <a:t> </a:t>
+            </a:r>
+            <a:r>
+              <a:rPr/>
+              <a:t>may</a:t>
+            </a:r>
+            <a:r>
+              <a:rPr/>
+              <a:t> </a:t>
+            </a:r>
+            <a:r>
+              <a:rPr/>
+              <a:t>cause.</a:t>
+            </a:r>
+          </a:p>
+        </p:txBody>
+      </p:sp>
+      <p:sp>
+        <p:nvSpPr>
+          <p:cNvPr id="4" name="Slide Number Placeholder 3"/>
+          <p:cNvSpPr>
+            <a:spLocks noGrp="1"/>
+          </p:cNvSpPr>
+          <p:nvPr>
+            <p:ph type="sldNum" sz="quarter" idx="10"/>
+          </p:nvPr>
+        </p:nvSpPr>
+        <p:spPr/>
+        <p:txBody>
+          <a:bodyPr/>
+          <a:lstStyle/>
+          <a:p>
+            <a:fld id="{18BDFEC3-8487-43E8-A154-7C12CBC1FFF2}" type="slidenum">
+              <a:rPr lang="en-US"/>
+              <a:t>25</a:t>
             </a:fld>
             <a:endParaRPr lang="en-US"/>
           </a:p>
@@ -14877,6 +15858,22 @@
             <a:br/>
             <a:r>
               <a:rPr/>
+              <a:t>Suman</a:t>
+            </a:r>
+            <a:r>
+              <a:rPr/>
+              <a:t> </a:t>
+            </a:r>
+            <a:r>
+              <a:rPr/>
+              <a:t>Sahil,</a:t>
+            </a:r>
+            <a:r>
+              <a:rPr/>
+              <a:t> </a:t>
+            </a:r>
+            <a:r>
+              <a:rPr/>
               <a:t>Steve</a:t>
             </a:r>
             <a:r>
@@ -16775,55 +17772,15 @@
             </a:pPr>
             <a:r>
               <a:rPr/>
-              <a:t>Do</a:t>
-            </a:r>
-            <a:r>
-              <a:rPr/>
-              <a:t> </a:t>
-            </a:r>
-            <a:r>
-              <a:rPr/>
-              <a:t>you</a:t>
-            </a:r>
-            <a:r>
-              <a:rPr/>
-              <a:t> </a:t>
-            </a:r>
-            <a:r>
-              <a:rPr/>
-              <a:t>really</a:t>
-            </a:r>
-            <a:r>
-              <a:rPr/>
-              <a:t> </a:t>
-            </a:r>
-            <a:r>
-              <a:rPr/>
-              <a:t>want</a:t>
-            </a:r>
-            <a:r>
-              <a:rPr/>
-              <a:t> </a:t>
-            </a:r>
-            <a:r>
-              <a:rPr/>
-              <a:t>all</a:t>
-            </a:r>
-            <a:r>
-              <a:rPr/>
-              <a:t> </a:t>
-            </a:r>
-            <a:r>
-              <a:rPr/>
-              <a:t>this</a:t>
-            </a:r>
-            <a:r>
-              <a:rPr/>
-              <a:t> </a:t>
-            </a:r>
-            <a:r>
-              <a:rPr/>
-              <a:t>hassle?</a:t>
+              <a:t>Special</a:t>
+            </a:r>
+            <a:r>
+              <a:rPr/>
+              <a:t> </a:t>
+            </a:r>
+            <a:r>
+              <a:rPr/>
+              <a:t>cases</a:t>
             </a:r>
           </a:p>
         </p:txBody>
@@ -16846,28 +17803,35 @@
             <a:pPr lvl="1"/>
             <a:r>
               <a:rPr/>
-              <a:t>Debate about whether you should use null values at all</a:t>
+              <a:t>FALSE and UNKNOWN</a:t>
             </a:r>
           </a:p>
           <a:p>
             <a:pPr lvl="2"/>
             <a:r>
               <a:rPr/>
-              <a:t>Never use them for identification codes</a:t>
+              <a:t>Both FALSE and FALSE, FALSE and TRUE evaluate to FALSE</a:t>
+            </a:r>
+          </a:p>
+          <a:p>
+            <a:pPr lvl="1"/>
+            <a:r>
+              <a:rPr/>
+              <a:t>TRUE or UKNOWN</a:t>
             </a:r>
           </a:p>
           <a:p>
             <a:pPr lvl="2"/>
             <a:r>
               <a:rPr/>
-              <a:t>Replace them with extreme values (-1, 99)</a:t>
+              <a:t>Both TRUE or TRUE, TRUE or FALSE evaluate to TRUE</a:t>
             </a:r>
           </a:p>
           <a:p>
             <a:pPr lvl="1"/>
             <a:r>
               <a:rPr/>
-              <a:t>Whatever your choice, tread carefully</a:t>
+              <a:t>Arithmetic analogy 0*NULL</a:t>
             </a:r>
           </a:p>
         </p:txBody>
@@ -16878,6 +17842,145 @@
 </file>
 
 <file path=ppt/slides/slide25.xml><?xml version="1.0" encoding="utf-8"?>
+<p:sld xmlns:a="http://schemas.openxmlformats.org/drawingml/2006/main" xmlns:r="http://schemas.openxmlformats.org/officeDocument/2006/relationships" xmlns:p="http://schemas.openxmlformats.org/presentationml/2006/main">
+  <p:cSld>
+    <p:spTree>
+      <p:nvGrpSpPr>
+        <p:cNvPr id="1" name=""/>
+        <p:cNvGrpSpPr/>
+        <p:nvPr/>
+      </p:nvGrpSpPr>
+      <p:grpSpPr>
+        <a:xfrm>
+          <a:off x="0" y="0"/>
+          <a:ext cx="0" cy="0"/>
+          <a:chOff x="0" y="0"/>
+          <a:chExt cx="0" cy="0"/>
+        </a:xfrm>
+      </p:grpSpPr>
+      <p:sp>
+        <p:nvSpPr>
+          <p:cNvPr id="2" name="Title 1"/>
+          <p:cNvSpPr>
+            <a:spLocks noGrp="1"/>
+          </p:cNvSpPr>
+          <p:nvPr>
+            <p:ph type="title"/>
+          </p:nvPr>
+        </p:nvSpPr>
+        <p:spPr/>
+        <p:txBody>
+          <a:bodyPr/>
+          <a:lstStyle/>
+          <a:p>
+            <a:pPr lvl="0" marL="0" indent="0">
+              <a:buNone/>
+            </a:pPr>
+            <a:r>
+              <a:rPr/>
+              <a:t>Do</a:t>
+            </a:r>
+            <a:r>
+              <a:rPr/>
+              <a:t> </a:t>
+            </a:r>
+            <a:r>
+              <a:rPr/>
+              <a:t>you</a:t>
+            </a:r>
+            <a:r>
+              <a:rPr/>
+              <a:t> </a:t>
+            </a:r>
+            <a:r>
+              <a:rPr/>
+              <a:t>really</a:t>
+            </a:r>
+            <a:r>
+              <a:rPr/>
+              <a:t> </a:t>
+            </a:r>
+            <a:r>
+              <a:rPr/>
+              <a:t>want</a:t>
+            </a:r>
+            <a:r>
+              <a:rPr/>
+              <a:t> </a:t>
+            </a:r>
+            <a:r>
+              <a:rPr/>
+              <a:t>all</a:t>
+            </a:r>
+            <a:r>
+              <a:rPr/>
+              <a:t> </a:t>
+            </a:r>
+            <a:r>
+              <a:rPr/>
+              <a:t>this</a:t>
+            </a:r>
+            <a:r>
+              <a:rPr/>
+              <a:t> </a:t>
+            </a:r>
+            <a:r>
+              <a:rPr/>
+              <a:t>hassle?</a:t>
+            </a:r>
+          </a:p>
+        </p:txBody>
+      </p:sp>
+      <p:sp>
+        <p:nvSpPr>
+          <p:cNvPr id="3" name="Content Placeholder 2"/>
+          <p:cNvSpPr>
+            <a:spLocks noGrp="1"/>
+          </p:cNvSpPr>
+          <p:nvPr>
+            <p:ph idx="1"/>
+          </p:nvPr>
+        </p:nvSpPr>
+        <p:spPr/>
+        <p:txBody>
+          <a:bodyPr/>
+          <a:lstStyle/>
+          <a:p>
+            <a:pPr lvl="1"/>
+            <a:r>
+              <a:rPr/>
+              <a:t>Debate about whether you should use null values at all</a:t>
+            </a:r>
+          </a:p>
+          <a:p>
+            <a:pPr lvl="2"/>
+            <a:r>
+              <a:rPr/>
+              <a:t>Never use them for identification codes</a:t>
+            </a:r>
+          </a:p>
+          <a:p>
+            <a:pPr lvl="2"/>
+            <a:r>
+              <a:rPr/>
+              <a:t>Replace them with extreme values (-1, 99)</a:t>
+            </a:r>
+          </a:p>
+          <a:p>
+            <a:pPr lvl="1"/>
+            <a:r>
+              <a:rPr/>
+              <a:t>Whatever your choice, tread carefully</a:t>
+            </a:r>
+          </a:p>
+        </p:txBody>
+      </p:sp>
+    </p:spTree>
+  </p:cSld>
+</p:sld>
+</file>
+
+<file path=ppt/slides/slide26.xml><?xml version="1.0" encoding="utf-8"?>
 <p:sld xmlns:a="http://schemas.openxmlformats.org/drawingml/2006/main" xmlns:r="http://schemas.openxmlformats.org/officeDocument/2006/relationships" xmlns:p="http://schemas.openxmlformats.org/presentationml/2006/main">
   <p:cSld>
     <p:spTree>

</xml_diff>